<commit_message>
Update COMP 397 - Project Presentation.pptx
</commit_message>
<xml_diff>
--- a/COMP 397 - Project Presentation.pptx
+++ b/COMP 397 - Project Presentation.pptx
@@ -5,18 +5,22 @@
     <p:sldMasterId id="2147483660" r:id="rId1"/>
   </p:sldMasterIdLst>
   <p:notesMasterIdLst>
-    <p:notesMasterId r:id="rId11"/>
+    <p:notesMasterId r:id="rId15"/>
   </p:notesMasterIdLst>
   <p:sldIdLst>
     <p:sldId id="256" r:id="rId2"/>
-    <p:sldId id="257" r:id="rId3"/>
-    <p:sldId id="258" r:id="rId4"/>
-    <p:sldId id="259" r:id="rId5"/>
-    <p:sldId id="260" r:id="rId6"/>
-    <p:sldId id="261" r:id="rId7"/>
-    <p:sldId id="262" r:id="rId8"/>
-    <p:sldId id="263" r:id="rId9"/>
-    <p:sldId id="264" r:id="rId10"/>
+    <p:sldId id="265" r:id="rId3"/>
+    <p:sldId id="257" r:id="rId4"/>
+    <p:sldId id="258" r:id="rId5"/>
+    <p:sldId id="259" r:id="rId6"/>
+    <p:sldId id="260" r:id="rId7"/>
+    <p:sldId id="261" r:id="rId8"/>
+    <p:sldId id="262" r:id="rId9"/>
+    <p:sldId id="263" r:id="rId10"/>
+    <p:sldId id="266" r:id="rId11"/>
+    <p:sldId id="267" r:id="rId12"/>
+    <p:sldId id="268" r:id="rId13"/>
+    <p:sldId id="264" r:id="rId14"/>
   </p:sldIdLst>
   <p:sldSz cx="9144000" cy="5143500" type="screen16x9"/>
   <p:notesSz cx="6858000" cy="9144000"/>
@@ -7925,7 +7929,488 @@
 </p:sld>
 </file>
 
+<file path=ppt/slides/slide10.xml><?xml version="1.0" encoding="utf-8"?>
+<p:sld xmlns:a="http://schemas.openxmlformats.org/drawingml/2006/main" xmlns:r="http://schemas.openxmlformats.org/officeDocument/2006/relationships" xmlns:p="http://schemas.openxmlformats.org/presentationml/2006/main">
+  <p:cSld>
+    <p:spTree>
+      <p:nvGrpSpPr>
+        <p:cNvPr id="1" name=""/>
+        <p:cNvGrpSpPr/>
+        <p:nvPr/>
+      </p:nvGrpSpPr>
+      <p:grpSpPr>
+        <a:xfrm>
+          <a:off x="0" y="0"/>
+          <a:ext cx="0" cy="0"/>
+          <a:chOff x="0" y="0"/>
+          <a:chExt cx="0" cy="0"/>
+        </a:xfrm>
+      </p:grpSpPr>
+      <p:sp>
+        <p:nvSpPr>
+          <p:cNvPr id="2" name="Título 1"/>
+          <p:cNvSpPr>
+            <a:spLocks noGrp="1"/>
+          </p:cNvSpPr>
+          <p:nvPr>
+            <p:ph type="title"/>
+          </p:nvPr>
+        </p:nvSpPr>
+        <p:spPr/>
+        <p:txBody>
+          <a:bodyPr>
+            <a:normAutofit fontScale="90000"/>
+          </a:bodyPr>
+          <a:lstStyle/>
+          <a:p>
+            <a:r>
+              <a:rPr lang="en-CA" dirty="0" smtClean="0"/>
+              <a:t>State Diagram</a:t>
+            </a:r>
+            <a:endParaRPr lang="en-CA" dirty="0"/>
+          </a:p>
+        </p:txBody>
+      </p:sp>
+      <p:sp>
+        <p:nvSpPr>
+          <p:cNvPr id="3" name="Espaço Reservado para Texto 2"/>
+          <p:cNvSpPr>
+            <a:spLocks noGrp="1"/>
+          </p:cNvSpPr>
+          <p:nvPr>
+            <p:ph type="body" idx="1"/>
+          </p:nvPr>
+        </p:nvSpPr>
+        <p:spPr/>
+        <p:txBody>
+          <a:bodyPr/>
+          <a:lstStyle/>
+          <a:p>
+            <a:endParaRPr lang="en-CA" dirty="0"/>
+          </a:p>
+        </p:txBody>
+      </p:sp>
+    </p:spTree>
+    <p:extLst>
+      <p:ext uri="{BB962C8B-B14F-4D97-AF65-F5344CB8AC3E}">
+        <p14:creationId xmlns:p14="http://schemas.microsoft.com/office/powerpoint/2010/main" val="4236854797"/>
+      </p:ext>
+    </p:extLst>
+  </p:cSld>
+  <p:clrMapOvr>
+    <a:masterClrMapping/>
+  </p:clrMapOvr>
+</p:sld>
+</file>
+
+<file path=ppt/slides/slide11.xml><?xml version="1.0" encoding="utf-8"?>
+<p:sld xmlns:a="http://schemas.openxmlformats.org/drawingml/2006/main" xmlns:r="http://schemas.openxmlformats.org/officeDocument/2006/relationships" xmlns:p="http://schemas.openxmlformats.org/presentationml/2006/main">
+  <p:cSld>
+    <p:spTree>
+      <p:nvGrpSpPr>
+        <p:cNvPr id="1" name=""/>
+        <p:cNvGrpSpPr/>
+        <p:nvPr/>
+      </p:nvGrpSpPr>
+      <p:grpSpPr>
+        <a:xfrm>
+          <a:off x="0" y="0"/>
+          <a:ext cx="0" cy="0"/>
+          <a:chOff x="0" y="0"/>
+          <a:chExt cx="0" cy="0"/>
+        </a:xfrm>
+      </p:grpSpPr>
+      <p:sp>
+        <p:nvSpPr>
+          <p:cNvPr id="2" name="Título 1"/>
+          <p:cNvSpPr>
+            <a:spLocks noGrp="1"/>
+          </p:cNvSpPr>
+          <p:nvPr>
+            <p:ph type="title"/>
+          </p:nvPr>
+        </p:nvSpPr>
+        <p:spPr/>
+        <p:txBody>
+          <a:bodyPr>
+            <a:normAutofit fontScale="90000"/>
+          </a:bodyPr>
+          <a:lstStyle/>
+          <a:p>
+            <a:r>
+              <a:rPr lang="en-CA" dirty="0" smtClean="0"/>
+              <a:t>Class Diagram</a:t>
+            </a:r>
+            <a:endParaRPr lang="en-CA" dirty="0"/>
+          </a:p>
+        </p:txBody>
+      </p:sp>
+      <p:sp>
+        <p:nvSpPr>
+          <p:cNvPr id="3" name="Espaço Reservado para Texto 2"/>
+          <p:cNvSpPr>
+            <a:spLocks noGrp="1"/>
+          </p:cNvSpPr>
+          <p:nvPr>
+            <p:ph type="body" idx="1"/>
+          </p:nvPr>
+        </p:nvSpPr>
+        <p:spPr/>
+        <p:txBody>
+          <a:bodyPr/>
+          <a:lstStyle/>
+          <a:p>
+            <a:endParaRPr lang="en-CA"/>
+          </a:p>
+        </p:txBody>
+      </p:sp>
+    </p:spTree>
+    <p:extLst>
+      <p:ext uri="{BB962C8B-B14F-4D97-AF65-F5344CB8AC3E}">
+        <p14:creationId xmlns:p14="http://schemas.microsoft.com/office/powerpoint/2010/main" val="297057072"/>
+      </p:ext>
+    </p:extLst>
+  </p:cSld>
+  <p:clrMapOvr>
+    <a:masterClrMapping/>
+  </p:clrMapOvr>
+</p:sld>
+</file>
+
+<file path=ppt/slides/slide12.xml><?xml version="1.0" encoding="utf-8"?>
+<p:sld xmlns:a="http://schemas.openxmlformats.org/drawingml/2006/main" xmlns:r="http://schemas.openxmlformats.org/officeDocument/2006/relationships" xmlns:p="http://schemas.openxmlformats.org/presentationml/2006/main">
+  <p:cSld>
+    <p:spTree>
+      <p:nvGrpSpPr>
+        <p:cNvPr id="1" name=""/>
+        <p:cNvGrpSpPr/>
+        <p:nvPr/>
+      </p:nvGrpSpPr>
+      <p:grpSpPr>
+        <a:xfrm>
+          <a:off x="0" y="0"/>
+          <a:ext cx="0" cy="0"/>
+          <a:chOff x="0" y="0"/>
+          <a:chExt cx="0" cy="0"/>
+        </a:xfrm>
+      </p:grpSpPr>
+      <p:sp>
+        <p:nvSpPr>
+          <p:cNvPr id="2" name="Título 1"/>
+          <p:cNvSpPr>
+            <a:spLocks noGrp="1"/>
+          </p:cNvSpPr>
+          <p:nvPr>
+            <p:ph type="title"/>
+          </p:nvPr>
+        </p:nvSpPr>
+        <p:spPr/>
+        <p:txBody>
+          <a:bodyPr>
+            <a:normAutofit fontScale="90000"/>
+          </a:bodyPr>
+          <a:lstStyle/>
+          <a:p>
+            <a:r>
+              <a:rPr lang="en-CA" dirty="0" smtClean="0"/>
+              <a:t>Classes</a:t>
+            </a:r>
+            <a:endParaRPr lang="en-CA" dirty="0"/>
+          </a:p>
+        </p:txBody>
+      </p:sp>
+      <p:sp>
+        <p:nvSpPr>
+          <p:cNvPr id="3" name="Espaço Reservado para Texto 2"/>
+          <p:cNvSpPr>
+            <a:spLocks noGrp="1"/>
+          </p:cNvSpPr>
+          <p:nvPr>
+            <p:ph type="body" idx="1"/>
+          </p:nvPr>
+        </p:nvSpPr>
+        <p:spPr/>
+        <p:txBody>
+          <a:bodyPr/>
+          <a:lstStyle/>
+          <a:p>
+            <a:endParaRPr lang="en-CA" dirty="0"/>
+          </a:p>
+        </p:txBody>
+      </p:sp>
+    </p:spTree>
+    <p:extLst>
+      <p:ext uri="{BB962C8B-B14F-4D97-AF65-F5344CB8AC3E}">
+        <p14:creationId xmlns:p14="http://schemas.microsoft.com/office/powerpoint/2010/main" val="1337829380"/>
+      </p:ext>
+    </p:extLst>
+  </p:cSld>
+  <p:clrMapOvr>
+    <a:masterClrMapping/>
+  </p:clrMapOvr>
+</p:sld>
+</file>
+
+<file path=ppt/slides/slide13.xml><?xml version="1.0" encoding="utf-8"?>
+<p:sld xmlns:a="http://schemas.openxmlformats.org/drawingml/2006/main" xmlns:r="http://schemas.openxmlformats.org/officeDocument/2006/relationships" xmlns:p="http://schemas.openxmlformats.org/presentationml/2006/main">
+  <p:cSld>
+    <p:spTree>
+      <p:nvGrpSpPr>
+        <p:cNvPr id="1" name="Shape 108"/>
+        <p:cNvGrpSpPr/>
+        <p:nvPr/>
+      </p:nvGrpSpPr>
+      <p:grpSpPr>
+        <a:xfrm>
+          <a:off x="0" y="0"/>
+          <a:ext cx="0" cy="0"/>
+          <a:chOff x="0" y="0"/>
+          <a:chExt cx="0" cy="0"/>
+        </a:xfrm>
+      </p:grpSpPr>
+      <p:sp>
+        <p:nvSpPr>
+          <p:cNvPr id="109" name="Google Shape;109;p21"/>
+          <p:cNvSpPr txBox="1">
+            <a:spLocks noGrp="1"/>
+          </p:cNvSpPr>
+          <p:nvPr>
+            <p:ph type="title"/>
+          </p:nvPr>
+        </p:nvSpPr>
+        <p:spPr>
+          <a:prstGeom prst="rect">
+            <a:avLst/>
+          </a:prstGeom>
+        </p:spPr>
+        <p:txBody>
+          <a:bodyPr spcFirstLastPara="1" wrap="square" lIns="91425" tIns="91425" rIns="91425" bIns="91425" anchor="t" anchorCtr="0">
+            <a:noAutofit/>
+          </a:bodyPr>
+          <a:lstStyle/>
+          <a:p>
+            <a:pPr marL="0" lvl="0" indent="0" algn="l" rtl="0">
+              <a:spcBef>
+                <a:spcPts val="0"/>
+              </a:spcBef>
+              <a:spcAft>
+                <a:spcPts val="0"/>
+              </a:spcAft>
+              <a:buNone/>
+            </a:pPr>
+            <a:r>
+              <a:rPr lang="en"/>
+              <a:t>Game link</a:t>
+            </a:r>
+            <a:endParaRPr/>
+          </a:p>
+        </p:txBody>
+      </p:sp>
+      <p:sp>
+        <p:nvSpPr>
+          <p:cNvPr id="110" name="Google Shape;110;p21"/>
+          <p:cNvSpPr txBox="1">
+            <a:spLocks noGrp="1"/>
+          </p:cNvSpPr>
+          <p:nvPr>
+            <p:ph type="body" idx="1"/>
+          </p:nvPr>
+        </p:nvSpPr>
+        <p:spPr>
+          <a:prstGeom prst="rect">
+            <a:avLst/>
+          </a:prstGeom>
+        </p:spPr>
+        <p:txBody>
+          <a:bodyPr spcFirstLastPara="1" wrap="square" lIns="91425" tIns="91425" rIns="91425" bIns="91425" anchor="t" anchorCtr="0">
+            <a:noAutofit/>
+          </a:bodyPr>
+          <a:lstStyle/>
+          <a:p>
+            <a:pPr marL="0" lvl="0" indent="0" algn="l" rtl="0">
+              <a:spcBef>
+                <a:spcPts val="0"/>
+              </a:spcBef>
+              <a:spcAft>
+                <a:spcPts val="0"/>
+              </a:spcAft>
+              <a:buNone/>
+            </a:pPr>
+            <a:endParaRPr dirty="0"/>
+          </a:p>
+          <a:p>
+            <a:pPr marL="0" lvl="0" indent="0" algn="l" rtl="0">
+              <a:spcBef>
+                <a:spcPts val="1600"/>
+              </a:spcBef>
+              <a:spcAft>
+                <a:spcPts val="1600"/>
+              </a:spcAft>
+              <a:buNone/>
+            </a:pPr>
+            <a:r>
+              <a:rPr lang="en" sz="1800" dirty="0">
+                <a:solidFill>
+                  <a:srgbClr val="0366D6"/>
+                </a:solidFill>
+                <a:uFill>
+                  <a:noFill/>
+                </a:uFill>
+                <a:hlinkClick r:id="rId3"/>
+              </a:rPr>
+              <a:t>https://robertoito.github.io/SP_FB/</a:t>
+            </a:r>
+            <a:endParaRPr sz="1800" dirty="0"/>
+          </a:p>
+        </p:txBody>
+      </p:sp>
+    </p:spTree>
+  </p:cSld>
+  <p:clrMapOvr>
+    <a:masterClrMapping/>
+  </p:clrMapOvr>
+  <p:timing>
+    <p:tnLst>
+      <p:par>
+        <p:cTn id="1" dur="indefinite" restart="never" nodeType="tmRoot"/>
+      </p:par>
+    </p:tnLst>
+  </p:timing>
+</p:sld>
+</file>
+
 <file path=ppt/slides/slide2.xml><?xml version="1.0" encoding="utf-8"?>
+<p:sld xmlns:a="http://schemas.openxmlformats.org/drawingml/2006/main" xmlns:r="http://schemas.openxmlformats.org/officeDocument/2006/relationships" xmlns:p="http://schemas.openxmlformats.org/presentationml/2006/main">
+  <p:cSld>
+    <p:spTree>
+      <p:nvGrpSpPr>
+        <p:cNvPr id="1" name=""/>
+        <p:cNvGrpSpPr/>
+        <p:nvPr/>
+      </p:nvGrpSpPr>
+      <p:grpSpPr>
+        <a:xfrm>
+          <a:off x="0" y="0"/>
+          <a:ext cx="0" cy="0"/>
+          <a:chOff x="0" y="0"/>
+          <a:chExt cx="0" cy="0"/>
+        </a:xfrm>
+      </p:grpSpPr>
+      <p:sp>
+        <p:nvSpPr>
+          <p:cNvPr id="2" name="Título 1"/>
+          <p:cNvSpPr>
+            <a:spLocks noGrp="1"/>
+          </p:cNvSpPr>
+          <p:nvPr>
+            <p:ph type="title"/>
+          </p:nvPr>
+        </p:nvSpPr>
+        <p:spPr/>
+        <p:txBody>
+          <a:bodyPr/>
+          <a:lstStyle/>
+          <a:p>
+            <a:r>
+              <a:rPr lang="en-CA" dirty="0" smtClean="0"/>
+              <a:t>Roles</a:t>
+            </a:r>
+            <a:endParaRPr lang="en-CA" dirty="0"/>
+          </a:p>
+        </p:txBody>
+      </p:sp>
+      <p:sp>
+        <p:nvSpPr>
+          <p:cNvPr id="3" name="Espaço Reservado para Conteúdo 2"/>
+          <p:cNvSpPr>
+            <a:spLocks noGrp="1"/>
+          </p:cNvSpPr>
+          <p:nvPr>
+            <p:ph idx="1"/>
+          </p:nvPr>
+        </p:nvSpPr>
+        <p:spPr/>
+        <p:txBody>
+          <a:bodyPr/>
+          <a:lstStyle/>
+          <a:p>
+            <a:r>
+              <a:rPr lang="en-CA" dirty="0" smtClean="0"/>
+              <a:t>Roberto Ito</a:t>
+            </a:r>
+          </a:p>
+          <a:p>
+            <a:pPr lvl="1"/>
+            <a:r>
+              <a:rPr lang="en-CA" dirty="0" smtClean="0"/>
+              <a:t>Designer</a:t>
+            </a:r>
+          </a:p>
+          <a:p>
+            <a:pPr lvl="1"/>
+            <a:r>
+              <a:rPr lang="en-CA" dirty="0" smtClean="0"/>
+              <a:t>Developer</a:t>
+            </a:r>
+          </a:p>
+          <a:p>
+            <a:pPr lvl="1"/>
+            <a:r>
+              <a:rPr lang="en-CA" dirty="0" smtClean="0"/>
+              <a:t>QA Tester</a:t>
+            </a:r>
+          </a:p>
+          <a:p>
+            <a:pPr lvl="1"/>
+            <a:endParaRPr lang="en-CA" dirty="0"/>
+          </a:p>
+          <a:p>
+            <a:r>
+              <a:rPr lang="en-CA" dirty="0" err="1" smtClean="0"/>
+              <a:t>Yayun</a:t>
+            </a:r>
+            <a:r>
+              <a:rPr lang="en-CA" dirty="0" smtClean="0"/>
+              <a:t> Yang</a:t>
+            </a:r>
+          </a:p>
+          <a:p>
+            <a:pPr lvl="1"/>
+            <a:r>
+              <a:rPr lang="en-CA" dirty="0" smtClean="0"/>
+              <a:t>Designer</a:t>
+            </a:r>
+          </a:p>
+          <a:p>
+            <a:pPr lvl="1"/>
+            <a:r>
+              <a:rPr lang="en-CA" dirty="0" smtClean="0"/>
+              <a:t>Developer</a:t>
+            </a:r>
+          </a:p>
+          <a:p>
+            <a:pPr lvl="1"/>
+            <a:r>
+              <a:rPr lang="en-CA" dirty="0" smtClean="0"/>
+              <a:t>QA Tester</a:t>
+            </a:r>
+          </a:p>
+        </p:txBody>
+      </p:sp>
+    </p:spTree>
+    <p:extLst>
+      <p:ext uri="{BB962C8B-B14F-4D97-AF65-F5344CB8AC3E}">
+        <p14:creationId xmlns:p14="http://schemas.microsoft.com/office/powerpoint/2010/main" val="21915647"/>
+      </p:ext>
+    </p:extLst>
+  </p:cSld>
+  <p:clrMapOvr>
+    <a:masterClrMapping/>
+  </p:clrMapOvr>
+</p:sld>
+</file>
+
+<file path=ppt/slides/slide3.xml><?xml version="1.0" encoding="utf-8"?>
 <p:sld xmlns:a="http://schemas.openxmlformats.org/drawingml/2006/main" xmlns:r="http://schemas.openxmlformats.org/officeDocument/2006/relationships" xmlns:p="http://schemas.openxmlformats.org/presentationml/2006/main">
   <p:cSld>
     <p:spTree>
@@ -8057,7 +8542,7 @@
 </p:sld>
 </file>
 
-<file path=ppt/slides/slide3.xml><?xml version="1.0" encoding="utf-8"?>
+<file path=ppt/slides/slide4.xml><?xml version="1.0" encoding="utf-8"?>
 <p:sld xmlns:a="http://schemas.openxmlformats.org/drawingml/2006/main" xmlns:r="http://schemas.openxmlformats.org/officeDocument/2006/relationships" xmlns:p="http://schemas.openxmlformats.org/presentationml/2006/main">
   <p:cSld>
     <p:spTree>
@@ -8226,7 +8711,7 @@
 </p:sld>
 </file>
 
-<file path=ppt/slides/slide4.xml><?xml version="1.0" encoding="utf-8"?>
+<file path=ppt/slides/slide5.xml><?xml version="1.0" encoding="utf-8"?>
 <p:sld xmlns:a="http://schemas.openxmlformats.org/drawingml/2006/main" xmlns:r="http://schemas.openxmlformats.org/officeDocument/2006/relationships" xmlns:p="http://schemas.openxmlformats.org/presentationml/2006/main">
   <p:cSld>
     <p:spTree>
@@ -8358,7 +8843,7 @@
 </p:sld>
 </file>
 
-<file path=ppt/slides/slide5.xml><?xml version="1.0" encoding="utf-8"?>
+<file path=ppt/slides/slide6.xml><?xml version="1.0" encoding="utf-8"?>
 <p:sld xmlns:a="http://schemas.openxmlformats.org/drawingml/2006/main" xmlns:r="http://schemas.openxmlformats.org/officeDocument/2006/relationships" xmlns:p="http://schemas.openxmlformats.org/presentationml/2006/main">
   <p:cSld>
     <p:spTree>
@@ -8618,7 +9103,7 @@
 </p:sld>
 </file>
 
-<file path=ppt/slides/slide6.xml><?xml version="1.0" encoding="utf-8"?>
+<file path=ppt/slides/slide7.xml><?xml version="1.0" encoding="utf-8"?>
 <p:sld xmlns:a="http://schemas.openxmlformats.org/drawingml/2006/main" xmlns:r="http://schemas.openxmlformats.org/officeDocument/2006/relationships" xmlns:p="http://schemas.openxmlformats.org/presentationml/2006/main">
   <p:cSld>
     <p:spTree>
@@ -8787,7 +9272,7 @@
 </p:sld>
 </file>
 
-<file path=ppt/slides/slide7.xml><?xml version="1.0" encoding="utf-8"?>
+<file path=ppt/slides/slide8.xml><?xml version="1.0" encoding="utf-8"?>
 <p:sld xmlns:a="http://schemas.openxmlformats.org/drawingml/2006/main" xmlns:r="http://schemas.openxmlformats.org/officeDocument/2006/relationships" xmlns:p="http://schemas.openxmlformats.org/presentationml/2006/main">
   <p:cSld>
     <p:spTree>
@@ -8926,7 +9411,7 @@
 </p:sld>
 </file>
 
-<file path=ppt/slides/slide8.xml><?xml version="1.0" encoding="utf-8"?>
+<file path=ppt/slides/slide9.xml><?xml version="1.0" encoding="utf-8"?>
 <p:sld xmlns:a="http://schemas.openxmlformats.org/drawingml/2006/main" xmlns:r="http://schemas.openxmlformats.org/officeDocument/2006/relationships" xmlns:p="http://schemas.openxmlformats.org/presentationml/2006/main">
   <p:cSld>
     <p:spTree>
@@ -9111,134 +9596,6 @@
           </a:ln>
         </p:spPr>
       </p:pic>
-    </p:spTree>
-  </p:cSld>
-  <p:clrMapOvr>
-    <a:masterClrMapping/>
-  </p:clrMapOvr>
-  <p:timing>
-    <p:tnLst>
-      <p:par>
-        <p:cTn id="1" dur="indefinite" restart="never" nodeType="tmRoot"/>
-      </p:par>
-    </p:tnLst>
-  </p:timing>
-</p:sld>
-</file>
-
-<file path=ppt/slides/slide9.xml><?xml version="1.0" encoding="utf-8"?>
-<p:sld xmlns:a="http://schemas.openxmlformats.org/drawingml/2006/main" xmlns:r="http://schemas.openxmlformats.org/officeDocument/2006/relationships" xmlns:p="http://schemas.openxmlformats.org/presentationml/2006/main">
-  <p:cSld>
-    <p:spTree>
-      <p:nvGrpSpPr>
-        <p:cNvPr id="1" name="Shape 108"/>
-        <p:cNvGrpSpPr/>
-        <p:nvPr/>
-      </p:nvGrpSpPr>
-      <p:grpSpPr>
-        <a:xfrm>
-          <a:off x="0" y="0"/>
-          <a:ext cx="0" cy="0"/>
-          <a:chOff x="0" y="0"/>
-          <a:chExt cx="0" cy="0"/>
-        </a:xfrm>
-      </p:grpSpPr>
-      <p:sp>
-        <p:nvSpPr>
-          <p:cNvPr id="109" name="Google Shape;109;p21"/>
-          <p:cNvSpPr txBox="1">
-            <a:spLocks noGrp="1"/>
-          </p:cNvSpPr>
-          <p:nvPr>
-            <p:ph type="title"/>
-          </p:nvPr>
-        </p:nvSpPr>
-        <p:spPr>
-          <a:prstGeom prst="rect">
-            <a:avLst/>
-          </a:prstGeom>
-        </p:spPr>
-        <p:txBody>
-          <a:bodyPr spcFirstLastPara="1" wrap="square" lIns="91425" tIns="91425" rIns="91425" bIns="91425" anchor="t" anchorCtr="0">
-            <a:noAutofit/>
-          </a:bodyPr>
-          <a:lstStyle/>
-          <a:p>
-            <a:pPr marL="0" lvl="0" indent="0" algn="l" rtl="0">
-              <a:spcBef>
-                <a:spcPts val="0"/>
-              </a:spcBef>
-              <a:spcAft>
-                <a:spcPts val="0"/>
-              </a:spcAft>
-              <a:buNone/>
-            </a:pPr>
-            <a:r>
-              <a:rPr lang="en"/>
-              <a:t>Game link</a:t>
-            </a:r>
-            <a:endParaRPr/>
-          </a:p>
-        </p:txBody>
-      </p:sp>
-      <p:sp>
-        <p:nvSpPr>
-          <p:cNvPr id="110" name="Google Shape;110;p21"/>
-          <p:cNvSpPr txBox="1">
-            <a:spLocks noGrp="1"/>
-          </p:cNvSpPr>
-          <p:nvPr>
-            <p:ph type="body" idx="1"/>
-          </p:nvPr>
-        </p:nvSpPr>
-        <p:spPr>
-          <a:prstGeom prst="rect">
-            <a:avLst/>
-          </a:prstGeom>
-        </p:spPr>
-        <p:txBody>
-          <a:bodyPr spcFirstLastPara="1" wrap="square" lIns="91425" tIns="91425" rIns="91425" bIns="91425" anchor="t" anchorCtr="0">
-            <a:noAutofit/>
-          </a:bodyPr>
-          <a:lstStyle/>
-          <a:p>
-            <a:pPr marL="0" lvl="0" indent="0" algn="l" rtl="0">
-              <a:spcBef>
-                <a:spcPts val="0"/>
-              </a:spcBef>
-              <a:spcAft>
-                <a:spcPts val="0"/>
-              </a:spcAft>
-              <a:buNone/>
-            </a:pPr>
-            <a:endParaRPr dirty="0"/>
-          </a:p>
-          <a:p>
-            <a:pPr marL="0" lvl="0" indent="0" algn="l" rtl="0">
-              <a:spcBef>
-                <a:spcPts val="1600"/>
-              </a:spcBef>
-              <a:spcAft>
-                <a:spcPts val="1600"/>
-              </a:spcAft>
-              <a:buNone/>
-            </a:pPr>
-            <a:r>
-              <a:rPr lang="en" sz="1800" dirty="0">
-                <a:solidFill>
-                  <a:srgbClr val="0366D6"/>
-                </a:solidFill>
-                <a:uFill>
-                  <a:noFill/>
-                </a:uFill>
-                <a:hlinkClick r:id="rId3"/>
-              </a:rPr>
-              <a:t>https://robertoito.github.io/SP_FB/</a:t>
-            </a:r>
-            <a:endParaRPr sz="1800" dirty="0"/>
-          </a:p>
-        </p:txBody>
-      </p:sp>
     </p:spTree>
   </p:cSld>
   <p:clrMapOvr>

</xml_diff>

<commit_message>
State Machine Diagram Updated
</commit_message>
<xml_diff>
--- a/COMP 397 - Project Presentation.pptx
+++ b/COMP 397 - Project Presentation.pptx
@@ -2237,7 +2237,7 @@
             <a:fld id="{B61BEF0D-F0BB-DE4B-95CE-6DB70DBA9567}" type="datetimeFigureOut">
               <a:rPr lang="en-US" dirty="0"/>
               <a:pPr/>
-              <a:t>4/12/2019</a:t>
+              <a:t>4/15/2019</a:t>
             </a:fld>
             <a:endParaRPr lang="en-US" dirty="0"/>
           </a:p>
@@ -2499,7 +2499,7 @@
             <a:fld id="{B61BEF0D-F0BB-DE4B-95CE-6DB70DBA9567}" type="datetimeFigureOut">
               <a:rPr lang="en-US" dirty="0"/>
               <a:pPr/>
-              <a:t>4/12/2019</a:t>
+              <a:t>4/15/2019</a:t>
             </a:fld>
             <a:endParaRPr lang="en-US" dirty="0"/>
           </a:p>
@@ -2824,7 +2824,7 @@
             <a:fld id="{B61BEF0D-F0BB-DE4B-95CE-6DB70DBA9567}" type="datetimeFigureOut">
               <a:rPr lang="en-US" dirty="0"/>
               <a:pPr/>
-              <a:t>4/12/2019</a:t>
+              <a:t>4/15/2019</a:t>
             </a:fld>
             <a:endParaRPr lang="en-US" dirty="0"/>
           </a:p>
@@ -3176,7 +3176,7 @@
             <a:fld id="{B61BEF0D-F0BB-DE4B-95CE-6DB70DBA9567}" type="datetimeFigureOut">
               <a:rPr lang="en-US" dirty="0"/>
               <a:pPr/>
-              <a:t>4/12/2019</a:t>
+              <a:t>4/15/2019</a:t>
             </a:fld>
             <a:endParaRPr lang="en-US" dirty="0"/>
           </a:p>
@@ -3501,7 +3501,7 @@
             <a:fld id="{B61BEF0D-F0BB-DE4B-95CE-6DB70DBA9567}" type="datetimeFigureOut">
               <a:rPr lang="en-US" dirty="0"/>
               <a:pPr/>
-              <a:t>4/12/2019</a:t>
+              <a:t>4/15/2019</a:t>
             </a:fld>
             <a:endParaRPr lang="en-US" dirty="0"/>
           </a:p>
@@ -3905,7 +3905,7 @@
             <a:fld id="{B61BEF0D-F0BB-DE4B-95CE-6DB70DBA9567}" type="datetimeFigureOut">
               <a:rPr lang="en-US" dirty="0"/>
               <a:pPr/>
-              <a:t>4/12/2019</a:t>
+              <a:t>4/15/2019</a:t>
             </a:fld>
             <a:endParaRPr lang="en-US" dirty="0"/>
           </a:p>
@@ -4085,7 +4085,7 @@
           <a:p>
             <a:fld id="{55C6B4A9-1611-4792-9094-5F34BCA07E0B}" type="datetimeFigureOut">
               <a:rPr lang="en-US" dirty="0"/>
-              <a:t>4/12/2019</a:t>
+              <a:t>4/15/2019</a:t>
             </a:fld>
             <a:endParaRPr lang="en-US" dirty="0"/>
           </a:p>
@@ -4276,7 +4276,7 @@
             <a:fld id="{B61BEF0D-F0BB-DE4B-95CE-6DB70DBA9567}" type="datetimeFigureOut">
               <a:rPr lang="en-US" dirty="0"/>
               <a:pPr/>
-              <a:t>4/12/2019</a:t>
+              <a:t>4/15/2019</a:t>
             </a:fld>
             <a:endParaRPr lang="en-US" dirty="0"/>
           </a:p>
@@ -4826,7 +4826,7 @@
             <a:fld id="{B61BEF0D-F0BB-DE4B-95CE-6DB70DBA9567}" type="datetimeFigureOut">
               <a:rPr lang="en-US" dirty="0"/>
               <a:pPr/>
-              <a:t>4/12/2019</a:t>
+              <a:t>4/15/2019</a:t>
             </a:fld>
             <a:endParaRPr lang="en-US" dirty="0"/>
           </a:p>
@@ -5084,7 +5084,7 @@
             <a:fld id="{B61BEF0D-F0BB-DE4B-95CE-6DB70DBA9567}" type="datetimeFigureOut">
               <a:rPr lang="en-US" dirty="0"/>
               <a:pPr/>
-              <a:t>4/12/2019</a:t>
+              <a:t>4/15/2019</a:t>
             </a:fld>
             <a:endParaRPr lang="en-US" dirty="0"/>
           </a:p>
@@ -5326,7 +5326,7 @@
           <a:p>
             <a:fld id="{EB712588-04B1-427B-82EE-E8DB90309F08}" type="datetimeFigureOut">
               <a:rPr lang="en-US" dirty="0"/>
-              <a:t>4/12/2019</a:t>
+              <a:t>4/15/2019</a:t>
             </a:fld>
             <a:endParaRPr lang="en-US" dirty="0"/>
           </a:p>
@@ -5711,7 +5711,7 @@
             <a:fld id="{B61BEF0D-F0BB-DE4B-95CE-6DB70DBA9567}" type="datetimeFigureOut">
               <a:rPr lang="en-US" dirty="0"/>
               <a:pPr/>
-              <a:t>4/12/2019</a:t>
+              <a:t>4/15/2019</a:t>
             </a:fld>
             <a:endParaRPr lang="en-US" dirty="0"/>
           </a:p>
@@ -5845,7 +5845,7 @@
             <a:fld id="{B61BEF0D-F0BB-DE4B-95CE-6DB70DBA9567}" type="datetimeFigureOut">
               <a:rPr lang="en-US" dirty="0"/>
               <a:pPr/>
-              <a:t>4/12/2019</a:t>
+              <a:t>4/15/2019</a:t>
             </a:fld>
             <a:endParaRPr lang="en-US" dirty="0"/>
           </a:p>
@@ -5951,7 +5951,7 @@
             <a:fld id="{B61BEF0D-F0BB-DE4B-95CE-6DB70DBA9567}" type="datetimeFigureOut">
               <a:rPr lang="en-US" dirty="0"/>
               <a:pPr/>
-              <a:t>4/12/2019</a:t>
+              <a:t>4/15/2019</a:t>
             </a:fld>
             <a:endParaRPr lang="en-US" dirty="0"/>
           </a:p>
@@ -6216,7 +6216,7 @@
           <a:p>
             <a:fld id="{42A54C80-263E-416B-A8E0-580EDEADCBDC}" type="datetimeFigureOut">
               <a:rPr lang="en-US" dirty="0"/>
-              <a:t>4/12/2019</a:t>
+              <a:t>4/15/2019</a:t>
             </a:fld>
             <a:endParaRPr lang="en-US" dirty="0"/>
           </a:p>
@@ -6490,7 +6490,7 @@
             <a:fld id="{B61BEF0D-F0BB-DE4B-95CE-6DB70DBA9567}" type="datetimeFigureOut">
               <a:rPr lang="en-US" dirty="0"/>
               <a:pPr/>
-              <a:t>4/12/2019</a:t>
+              <a:t>4/15/2019</a:t>
             </a:fld>
             <a:endParaRPr lang="en-US" dirty="0"/>
           </a:p>
@@ -7244,7 +7244,7 @@
             <a:fld id="{B61BEF0D-F0BB-DE4B-95CE-6DB70DBA9567}" type="datetimeFigureOut">
               <a:rPr lang="en-US" dirty="0"/>
               <a:pPr/>
-              <a:t>4/12/2019</a:t>
+              <a:t>4/15/2019</a:t>
             </a:fld>
             <a:endParaRPr lang="en-US" dirty="0"/>
           </a:p>
@@ -7973,10 +7973,10 @@
       </p:sp>
       <p:pic>
         <p:nvPicPr>
-          <p:cNvPr id="5" name="Picture 4">
+          <p:cNvPr id="6" name="Picture 5" descr="State Machine.vsdx - Visio Professional">
             <a:extLst>
               <a:ext uri="{FF2B5EF4-FFF2-40B4-BE49-F238E27FC236}">
-                <a16:creationId xmlns:a16="http://schemas.microsoft.com/office/drawing/2014/main" id="{0D677061-1FE2-4F4B-971B-7A66F15B3A3A}"/>
+                <a16:creationId xmlns:a16="http://schemas.microsoft.com/office/drawing/2014/main" id="{43DC74AE-B818-48E7-AB4D-2EB262CAFE0A}"/>
               </a:ext>
             </a:extLst>
           </p:cNvPr>
@@ -7985,16 +7985,15 @@
           </p:cNvPicPr>
           <p:nvPr/>
         </p:nvPicPr>
-        <p:blipFill>
+        <p:blipFill rotWithShape="1">
           <a:blip r:embed="rId2"/>
-          <a:stretch>
-            <a:fillRect/>
-          </a:stretch>
+          <a:srcRect l="26025" t="35132" r="16313" b="31287"/>
+          <a:stretch/>
         </p:blipFill>
         <p:spPr>
           <a:xfrm>
-            <a:off x="441736" y="1152475"/>
-            <a:ext cx="8260528" cy="3175952"/>
+            <a:off x="270986" y="1186021"/>
+            <a:ext cx="7679756" cy="3206636"/>
           </a:xfrm>
           <a:prstGeom prst="rect">
             <a:avLst/>

</xml_diff>